<commit_message>
stabilisation de l'application A
</commit_message>
<xml_diff>
--- a/Diapositives de presentation.pptx
+++ b/Diapositives de presentation.pptx
@@ -5,7 +5,7 @@
     <p:sldMasterId id="2147483856" r:id="rId1"/>
   </p:sldMasterIdLst>
   <p:notesMasterIdLst>
-    <p:notesMasterId r:id="rId14"/>
+    <p:notesMasterId r:id="rId15"/>
   </p:notesMasterIdLst>
   <p:sldIdLst>
     <p:sldId id="271" r:id="rId2"/>
@@ -18,8 +18,9 @@
     <p:sldId id="481" r:id="rId9"/>
     <p:sldId id="486" r:id="rId10"/>
     <p:sldId id="487" r:id="rId11"/>
-    <p:sldId id="484" r:id="rId12"/>
-    <p:sldId id="482" r:id="rId13"/>
+    <p:sldId id="488" r:id="rId12"/>
+    <p:sldId id="484" r:id="rId13"/>
+    <p:sldId id="482" r:id="rId14"/>
   </p:sldIdLst>
   <p:sldSz cx="12192000" cy="6858000"/>
   <p:notesSz cx="6858000" cy="9144000"/>
@@ -234,7 +235,7 @@
           <a:p>
             <a:fld id="{C83129A4-13CA-454A-9701-F815788E5EF5}" type="datetimeFigureOut">
               <a:rPr lang="fr-FR" smtClean="0"/>
-              <a:t>18/12/2024</a:t>
+              <a:t>26/12/2024</a:t>
             </a:fld>
             <a:endParaRPr lang="fr-FR"/>
           </a:p>
@@ -630,7 +631,7 @@
           <a:p>
             <a:fld id="{1C038D69-E8C6-41F4-B320-1C8C485B6F43}" type="datetime1">
               <a:rPr lang="fr-FR" smtClean="0"/>
-              <a:t>18/12/2024</a:t>
+              <a:t>26/12/2024</a:t>
             </a:fld>
             <a:endParaRPr lang="fr-FR"/>
           </a:p>
@@ -837,7 +838,7 @@
           <a:p>
             <a:fld id="{616DC8CD-C26B-4098-BB10-9DDAEE5B9BCE}" type="datetime1">
               <a:rPr lang="fr-FR" smtClean="0"/>
-              <a:t>18/12/2024</a:t>
+              <a:t>26/12/2024</a:t>
             </a:fld>
             <a:endParaRPr lang="fr-FR"/>
           </a:p>
@@ -1015,7 +1016,7 @@
           <a:p>
             <a:fld id="{D4079226-37CB-426E-B289-8E25D3475401}" type="datetime1">
               <a:rPr lang="fr-FR" smtClean="0"/>
-              <a:t>18/12/2024</a:t>
+              <a:t>26/12/2024</a:t>
             </a:fld>
             <a:endParaRPr lang="fr-FR"/>
           </a:p>
@@ -1110,7 +1111,7 @@
           <a:p>
             <a:fld id="{F6B747DC-6B14-4AFB-A709-02A30F487EAE}" type="datetime1">
               <a:rPr lang="fr-FR" smtClean="0"/>
-              <a:t>18/12/2024</a:t>
+              <a:t>26/12/2024</a:t>
             </a:fld>
             <a:endParaRPr lang="fr-FR"/>
           </a:p>
@@ -1317,7 +1318,7 @@
           <a:p>
             <a:fld id="{F6B747DC-6B14-4AFB-A709-02A30F487EAE}" type="datetime1">
               <a:rPr lang="fr-FR" smtClean="0"/>
-              <a:t>18/12/2024</a:t>
+              <a:t>26/12/2024</a:t>
             </a:fld>
             <a:endParaRPr lang="fr-FR"/>
           </a:p>
@@ -1524,7 +1525,7 @@
           <a:p>
             <a:fld id="{F6B747DC-6B14-4AFB-A709-02A30F487EAE}" type="datetime1">
               <a:rPr lang="fr-FR" smtClean="0"/>
-              <a:t>18/12/2024</a:t>
+              <a:t>26/12/2024</a:t>
             </a:fld>
             <a:endParaRPr lang="fr-FR"/>
           </a:p>
@@ -1731,7 +1732,7 @@
           <a:p>
             <a:fld id="{F6B747DC-6B14-4AFB-A709-02A30F487EAE}" type="datetime1">
               <a:rPr lang="fr-FR" smtClean="0"/>
-              <a:t>18/12/2024</a:t>
+              <a:t>26/12/2024</a:t>
             </a:fld>
             <a:endParaRPr lang="fr-FR"/>
           </a:p>
@@ -1938,7 +1939,7 @@
           <a:p>
             <a:fld id="{F6B747DC-6B14-4AFB-A709-02A30F487EAE}" type="datetime1">
               <a:rPr lang="fr-FR" smtClean="0"/>
-              <a:t>18/12/2024</a:t>
+              <a:t>26/12/2024</a:t>
             </a:fld>
             <a:endParaRPr lang="fr-FR"/>
           </a:p>
@@ -2145,7 +2146,7 @@
           <a:p>
             <a:fld id="{F6B747DC-6B14-4AFB-A709-02A30F487EAE}" type="datetime1">
               <a:rPr lang="fr-FR" smtClean="0"/>
-              <a:t>18/12/2024</a:t>
+              <a:t>26/12/2024</a:t>
             </a:fld>
             <a:endParaRPr lang="fr-FR"/>
           </a:p>
@@ -2352,7 +2353,7 @@
           <a:p>
             <a:fld id="{F6B747DC-6B14-4AFB-A709-02A30F487EAE}" type="datetime1">
               <a:rPr lang="fr-FR" smtClean="0"/>
-              <a:t>18/12/2024</a:t>
+              <a:t>26/12/2024</a:t>
             </a:fld>
             <a:endParaRPr lang="fr-FR"/>
           </a:p>
@@ -2559,7 +2560,7 @@
           <a:p>
             <a:fld id="{F6B747DC-6B14-4AFB-A709-02A30F487EAE}" type="datetime1">
               <a:rPr lang="fr-FR" smtClean="0"/>
-              <a:t>18/12/2024</a:t>
+              <a:t>26/12/2024</a:t>
             </a:fld>
             <a:endParaRPr lang="fr-FR"/>
           </a:p>
@@ -2839,7 +2840,7 @@
           <a:p>
             <a:fld id="{528315D5-587C-4700-832D-CB7F8BC01C0F}" type="datetime1">
               <a:rPr lang="fr-FR" smtClean="0"/>
-              <a:t>18/12/2024</a:t>
+              <a:t>26/12/2024</a:t>
             </a:fld>
             <a:endParaRPr lang="fr-FR"/>
           </a:p>
@@ -3085,7 +3086,7 @@
           <a:p>
             <a:fld id="{40E68B3C-FDDD-4703-9E79-D68F45540A20}" type="datetime1">
               <a:rPr lang="fr-FR" smtClean="0"/>
-              <a:t>18/12/2024</a:t>
+              <a:t>26/12/2024</a:t>
             </a:fld>
             <a:endParaRPr lang="fr-FR"/>
           </a:p>
@@ -3314,7 +3315,7 @@
           <a:p>
             <a:fld id="{3C263683-9D2E-4B48-953F-B9784A5AAE78}" type="datetime1">
               <a:rPr lang="fr-FR" smtClean="0"/>
-              <a:t>18/12/2024</a:t>
+              <a:t>26/12/2024</a:t>
             </a:fld>
             <a:endParaRPr lang="fr-FR"/>
           </a:p>
@@ -3678,7 +3679,7 @@
           <a:p>
             <a:fld id="{7F0B7BBE-AECC-41F0-893A-7D2E8C089F5C}" type="datetime1">
               <a:rPr lang="fr-FR" smtClean="0"/>
-              <a:t>18/12/2024</a:t>
+              <a:t>26/12/2024</a:t>
             </a:fld>
             <a:endParaRPr lang="fr-FR"/>
           </a:p>
@@ -3795,7 +3796,7 @@
           <a:p>
             <a:fld id="{426F0B9E-0863-404B-A3E2-D58EA83ACDC5}" type="datetime1">
               <a:rPr lang="fr-FR" smtClean="0"/>
-              <a:t>18/12/2024</a:t>
+              <a:t>26/12/2024</a:t>
             </a:fld>
             <a:endParaRPr lang="fr-FR"/>
           </a:p>
@@ -3890,7 +3891,7 @@
           <a:p>
             <a:fld id="{4EC7B2EC-1B5B-4386-8796-A1B046544C15}" type="datetime1">
               <a:rPr lang="fr-FR" smtClean="0"/>
-              <a:t>18/12/2024</a:t>
+              <a:t>26/12/2024</a:t>
             </a:fld>
             <a:endParaRPr lang="fr-FR"/>
           </a:p>
@@ -4165,7 +4166,7 @@
           <a:p>
             <a:fld id="{43AD984E-D9C5-44AD-BE15-3CF05681CFD8}" type="datetime1">
               <a:rPr lang="fr-FR" smtClean="0"/>
-              <a:t>18/12/2024</a:t>
+              <a:t>26/12/2024</a:t>
             </a:fld>
             <a:endParaRPr lang="fr-FR"/>
           </a:p>
@@ -4417,7 +4418,7 @@
           <a:p>
             <a:fld id="{CC476FF9-AD78-4ED2-8C79-DDAF60FCAAD4}" type="datetime1">
               <a:rPr lang="fr-FR" smtClean="0"/>
-              <a:t>18/12/2024</a:t>
+              <a:t>26/12/2024</a:t>
             </a:fld>
             <a:endParaRPr lang="fr-FR"/>
           </a:p>
@@ -4628,7 +4629,7 @@
           <a:p>
             <a:fld id="{528315D5-587C-4700-832D-CB7F8BC01C0F}" type="datetime1">
               <a:rPr lang="fr-FR" smtClean="0"/>
-              <a:t>18/12/2024</a:t>
+              <a:t>26/12/2024</a:t>
             </a:fld>
             <a:endParaRPr lang="fr-FR"/>
           </a:p>
@@ -6524,6 +6525,981 @@
         <p:cNvPr id="1" name="">
           <a:extLst>
             <a:ext uri="{FF2B5EF4-FFF2-40B4-BE49-F238E27FC236}">
+              <a16:creationId xmlns:a16="http://schemas.microsoft.com/office/drawing/2014/main" id="{C185FA75-4F50-7030-B31E-371FB0D70FAD}"/>
+            </a:ext>
+          </a:extLst>
+        </p:cNvPr>
+        <p:cNvGrpSpPr/>
+        <p:nvPr/>
+      </p:nvGrpSpPr>
+      <p:grpSpPr>
+        <a:xfrm>
+          <a:off x="0" y="0"/>
+          <a:ext cx="0" cy="0"/>
+          <a:chOff x="0" y="0"/>
+          <a:chExt cx="0" cy="0"/>
+        </a:xfrm>
+      </p:grpSpPr>
+      <p:sp>
+        <p:nvSpPr>
+          <p:cNvPr id="2" name="Espace réservé du numéro de diapositive 1">
+            <a:extLst>
+              <a:ext uri="{FF2B5EF4-FFF2-40B4-BE49-F238E27FC236}">
+                <a16:creationId xmlns:a16="http://schemas.microsoft.com/office/drawing/2014/main" id="{C23F12F8-0C29-2C2B-4747-11B1C5101C1C}"/>
+              </a:ext>
+            </a:extLst>
+          </p:cNvPr>
+          <p:cNvSpPr>
+            <a:spLocks noGrp="1"/>
+          </p:cNvSpPr>
+          <p:nvPr>
+            <p:ph type="sldNum" sz="quarter" idx="12"/>
+          </p:nvPr>
+        </p:nvSpPr>
+        <p:spPr>
+          <a:xfrm>
+            <a:off x="11719250" y="6487122"/>
+            <a:ext cx="454090" cy="365125"/>
+          </a:xfrm>
+        </p:spPr>
+        <p:txBody>
+          <a:bodyPr/>
+          <a:lstStyle/>
+          <a:p>
+            <a:fld id="{D2B4BBCC-EA5B-4A7E-8C0A-AC47B4F5C809}" type="slidenum">
+              <a:rPr lang="fr-FR" smtClean="0"/>
+              <a:pPr/>
+              <a:t>11</a:t>
+            </a:fld>
+            <a:endParaRPr lang="fr-FR" dirty="0"/>
+          </a:p>
+        </p:txBody>
+      </p:sp>
+      <p:sp>
+        <p:nvSpPr>
+          <p:cNvPr id="3" name="TextBox 6">
+            <a:extLst>
+              <a:ext uri="{FF2B5EF4-FFF2-40B4-BE49-F238E27FC236}">
+                <a16:creationId xmlns:a16="http://schemas.microsoft.com/office/drawing/2014/main" id="{74BED023-1503-A891-C737-0AED501FCAAA}"/>
+              </a:ext>
+            </a:extLst>
+          </p:cNvPr>
+          <p:cNvSpPr txBox="1"/>
+          <p:nvPr/>
+        </p:nvSpPr>
+        <p:spPr>
+          <a:xfrm>
+            <a:off x="1654629" y="-1365"/>
+            <a:ext cx="8882742" cy="523220"/>
+          </a:xfrm>
+          <a:prstGeom prst="rect">
+            <a:avLst/>
+          </a:prstGeom>
+          <a:noFill/>
+        </p:spPr>
+        <p:txBody>
+          <a:bodyPr wrap="square" rtlCol="0">
+            <a:spAutoFit/>
+          </a:bodyPr>
+          <a:lstStyle/>
+          <a:p>
+            <a:pPr algn="ctr"/>
+            <a:r>
+              <a:rPr lang="fr-FR" sz="2800" b="1" spc="300" dirty="0">
+                <a:solidFill>
+                  <a:schemeClr val="tx1">
+                    <a:lumMod val="95000"/>
+                    <a:lumOff val="5000"/>
+                  </a:schemeClr>
+                </a:solidFill>
+                <a:latin typeface="Montserrat SemiBold" panose="00000700000000000000" pitchFamily="2" charset="0"/>
+              </a:rPr>
+              <a:t>ANALYSE ET CONCEPTION</a:t>
+            </a:r>
+            <a:endParaRPr lang="lt-LT" sz="2800" b="1" spc="300" dirty="0">
+              <a:solidFill>
+                <a:schemeClr val="tx1">
+                  <a:lumMod val="95000"/>
+                  <a:lumOff val="5000"/>
+                </a:schemeClr>
+              </a:solidFill>
+              <a:latin typeface="Montserrat SemiBold" panose="00000700000000000000" pitchFamily="2" charset="0"/>
+            </a:endParaRPr>
+          </a:p>
+        </p:txBody>
+      </p:sp>
+      <p:sp>
+        <p:nvSpPr>
+          <p:cNvPr id="17" name="Rectangle 13">
+            <a:extLst>
+              <a:ext uri="{FF2B5EF4-FFF2-40B4-BE49-F238E27FC236}">
+                <a16:creationId xmlns:a16="http://schemas.microsoft.com/office/drawing/2014/main" id="{575B6DA5-C157-82B8-8BF0-0CC6B19CF018}"/>
+              </a:ext>
+            </a:extLst>
+          </p:cNvPr>
+          <p:cNvSpPr>
+            <a:spLocks noChangeArrowheads="1"/>
+          </p:cNvSpPr>
+          <p:nvPr/>
+        </p:nvSpPr>
+        <p:spPr bwMode="auto">
+          <a:xfrm>
+            <a:off x="0" y="43934"/>
+            <a:ext cx="184731" cy="369332"/>
+          </a:xfrm>
+          <a:prstGeom prst="rect">
+            <a:avLst/>
+          </a:prstGeom>
+          <a:noFill/>
+          <a:ln>
+            <a:noFill/>
+          </a:ln>
+          <a:effectLst/>
+          <a:extLst>
+            <a:ext uri="{909E8E84-426E-40DD-AFC4-6F175D3DCCD1}">
+              <a14:hiddenFill xmlns:a14="http://schemas.microsoft.com/office/drawing/2010/main">
+                <a:solidFill>
+                  <a:schemeClr val="accent1"/>
+                </a:solidFill>
+              </a14:hiddenFill>
+            </a:ext>
+            <a:ext uri="{91240B29-F687-4F45-9708-019B960494DF}">
+              <a14:hiddenLine xmlns:a14="http://schemas.microsoft.com/office/drawing/2010/main" w="9525">
+                <a:solidFill>
+                  <a:schemeClr val="tx1"/>
+                </a:solidFill>
+                <a:miter lim="800000"/>
+                <a:headEnd/>
+                <a:tailEnd/>
+              </a14:hiddenLine>
+            </a:ext>
+            <a:ext uri="{AF507438-7753-43E0-B8FC-AC1667EBCBE1}">
+              <a14:hiddenEffects xmlns:a14="http://schemas.microsoft.com/office/drawing/2010/main">
+                <a:effectLst>
+                  <a:outerShdw dist="35921" dir="2700000" algn="ctr" rotWithShape="0">
+                    <a:schemeClr val="bg2"/>
+                  </a:outerShdw>
+                </a:effectLst>
+              </a14:hiddenEffects>
+            </a:ext>
+          </a:extLst>
+        </p:spPr>
+        <p:txBody>
+          <a:bodyPr vert="horz" wrap="none" lIns="91440" tIns="45720" rIns="91440" bIns="45720" numCol="1" anchor="ctr" anchorCtr="0" compatLnSpc="1">
+            <a:prstTxWarp prst="textNoShape">
+              <a:avLst/>
+            </a:prstTxWarp>
+            <a:spAutoFit/>
+          </a:bodyPr>
+          <a:lstStyle/>
+          <a:p>
+            <a:endParaRPr lang="fr-FR"/>
+          </a:p>
+        </p:txBody>
+      </p:sp>
+      <p:sp>
+        <p:nvSpPr>
+          <p:cNvPr id="19" name="Rectangle 15">
+            <a:extLst>
+              <a:ext uri="{FF2B5EF4-FFF2-40B4-BE49-F238E27FC236}">
+                <a16:creationId xmlns:a16="http://schemas.microsoft.com/office/drawing/2014/main" id="{2CD32C2B-F1BC-8C97-B036-1C7E25696EB2}"/>
+              </a:ext>
+            </a:extLst>
+          </p:cNvPr>
+          <p:cNvSpPr>
+            <a:spLocks noChangeArrowheads="1"/>
+          </p:cNvSpPr>
+          <p:nvPr/>
+        </p:nvSpPr>
+        <p:spPr bwMode="auto">
+          <a:xfrm>
+            <a:off x="0" y="8761657"/>
+            <a:ext cx="184731" cy="369332"/>
+          </a:xfrm>
+          <a:prstGeom prst="rect">
+            <a:avLst/>
+          </a:prstGeom>
+          <a:noFill/>
+          <a:ln>
+            <a:noFill/>
+          </a:ln>
+          <a:effectLst/>
+          <a:extLst>
+            <a:ext uri="{909E8E84-426E-40DD-AFC4-6F175D3DCCD1}">
+              <a14:hiddenFill xmlns:a14="http://schemas.microsoft.com/office/drawing/2010/main">
+                <a:solidFill>
+                  <a:schemeClr val="accent1"/>
+                </a:solidFill>
+              </a14:hiddenFill>
+            </a:ext>
+            <a:ext uri="{91240B29-F687-4F45-9708-019B960494DF}">
+              <a14:hiddenLine xmlns:a14="http://schemas.microsoft.com/office/drawing/2010/main" w="9525">
+                <a:solidFill>
+                  <a:schemeClr val="tx1"/>
+                </a:solidFill>
+                <a:miter lim="800000"/>
+                <a:headEnd/>
+                <a:tailEnd/>
+              </a14:hiddenLine>
+            </a:ext>
+            <a:ext uri="{AF507438-7753-43E0-B8FC-AC1667EBCBE1}">
+              <a14:hiddenEffects xmlns:a14="http://schemas.microsoft.com/office/drawing/2010/main">
+                <a:effectLst>
+                  <a:outerShdw dist="35921" dir="2700000" algn="ctr" rotWithShape="0">
+                    <a:schemeClr val="bg2"/>
+                  </a:outerShdw>
+                </a:effectLst>
+              </a14:hiddenEffects>
+            </a:ext>
+          </a:extLst>
+        </p:spPr>
+        <p:txBody>
+          <a:bodyPr vert="horz" wrap="none" lIns="91440" tIns="45720" rIns="91440" bIns="45720" numCol="1" anchor="ctr" anchorCtr="0" compatLnSpc="1">
+            <a:prstTxWarp prst="textNoShape">
+              <a:avLst/>
+            </a:prstTxWarp>
+            <a:spAutoFit/>
+          </a:bodyPr>
+          <a:lstStyle/>
+          <a:p>
+            <a:endParaRPr lang="fr-FR"/>
+          </a:p>
+        </p:txBody>
+      </p:sp>
+      <p:sp>
+        <p:nvSpPr>
+          <p:cNvPr id="33" name="Rectangle 32">
+            <a:extLst>
+              <a:ext uri="{FF2B5EF4-FFF2-40B4-BE49-F238E27FC236}">
+                <a16:creationId xmlns:a16="http://schemas.microsoft.com/office/drawing/2014/main" id="{5E4D7580-021E-AAD9-E797-26830924E08E}"/>
+              </a:ext>
+            </a:extLst>
+          </p:cNvPr>
+          <p:cNvSpPr>
+            <a:spLocks noChangeArrowheads="1"/>
+          </p:cNvSpPr>
+          <p:nvPr/>
+        </p:nvSpPr>
+        <p:spPr bwMode="auto">
+          <a:xfrm>
+            <a:off x="0" y="7475782"/>
+            <a:ext cx="184731" cy="369332"/>
+          </a:xfrm>
+          <a:prstGeom prst="rect">
+            <a:avLst/>
+          </a:prstGeom>
+          <a:noFill/>
+          <a:ln>
+            <a:noFill/>
+          </a:ln>
+          <a:effectLst/>
+          <a:extLst>
+            <a:ext uri="{909E8E84-426E-40DD-AFC4-6F175D3DCCD1}">
+              <a14:hiddenFill xmlns:a14="http://schemas.microsoft.com/office/drawing/2010/main">
+                <a:solidFill>
+                  <a:schemeClr val="accent1"/>
+                </a:solidFill>
+              </a14:hiddenFill>
+            </a:ext>
+            <a:ext uri="{91240B29-F687-4F45-9708-019B960494DF}">
+              <a14:hiddenLine xmlns:a14="http://schemas.microsoft.com/office/drawing/2010/main" w="9525">
+                <a:solidFill>
+                  <a:schemeClr val="tx1"/>
+                </a:solidFill>
+                <a:miter lim="800000"/>
+                <a:headEnd/>
+                <a:tailEnd/>
+              </a14:hiddenLine>
+            </a:ext>
+            <a:ext uri="{AF507438-7753-43E0-B8FC-AC1667EBCBE1}">
+              <a14:hiddenEffects xmlns:a14="http://schemas.microsoft.com/office/drawing/2010/main">
+                <a:effectLst>
+                  <a:outerShdw dist="35921" dir="2700000" algn="ctr" rotWithShape="0">
+                    <a:schemeClr val="bg2"/>
+                  </a:outerShdw>
+                </a:effectLst>
+              </a14:hiddenEffects>
+            </a:ext>
+          </a:extLst>
+        </p:spPr>
+        <p:txBody>
+          <a:bodyPr vert="horz" wrap="none" lIns="91440" tIns="45720" rIns="91440" bIns="45720" numCol="1" anchor="ctr" anchorCtr="0" compatLnSpc="1">
+            <a:prstTxWarp prst="textNoShape">
+              <a:avLst/>
+            </a:prstTxWarp>
+            <a:spAutoFit/>
+          </a:bodyPr>
+          <a:lstStyle/>
+          <a:p>
+            <a:endParaRPr lang="fr-FR"/>
+          </a:p>
+        </p:txBody>
+      </p:sp>
+      <p:sp>
+        <p:nvSpPr>
+          <p:cNvPr id="34" name="Rectangle 33">
+            <a:extLst>
+              <a:ext uri="{FF2B5EF4-FFF2-40B4-BE49-F238E27FC236}">
+                <a16:creationId xmlns:a16="http://schemas.microsoft.com/office/drawing/2014/main" id="{C2EC9ECE-0E05-A8D7-2084-8CDB28568372}"/>
+              </a:ext>
+            </a:extLst>
+          </p:cNvPr>
+          <p:cNvSpPr>
+            <a:spLocks noChangeArrowheads="1"/>
+          </p:cNvSpPr>
+          <p:nvPr/>
+        </p:nvSpPr>
+        <p:spPr bwMode="auto">
+          <a:xfrm>
+            <a:off x="0" y="10466632"/>
+            <a:ext cx="184731" cy="369332"/>
+          </a:xfrm>
+          <a:prstGeom prst="rect">
+            <a:avLst/>
+          </a:prstGeom>
+          <a:noFill/>
+          <a:ln>
+            <a:noFill/>
+          </a:ln>
+          <a:effectLst/>
+          <a:extLst>
+            <a:ext uri="{909E8E84-426E-40DD-AFC4-6F175D3DCCD1}">
+              <a14:hiddenFill xmlns:a14="http://schemas.microsoft.com/office/drawing/2010/main">
+                <a:solidFill>
+                  <a:schemeClr val="accent1"/>
+                </a:solidFill>
+              </a14:hiddenFill>
+            </a:ext>
+            <a:ext uri="{91240B29-F687-4F45-9708-019B960494DF}">
+              <a14:hiddenLine xmlns:a14="http://schemas.microsoft.com/office/drawing/2010/main" w="9525">
+                <a:solidFill>
+                  <a:schemeClr val="tx1"/>
+                </a:solidFill>
+                <a:miter lim="800000"/>
+                <a:headEnd/>
+                <a:tailEnd/>
+              </a14:hiddenLine>
+            </a:ext>
+            <a:ext uri="{AF507438-7753-43E0-B8FC-AC1667EBCBE1}">
+              <a14:hiddenEffects xmlns:a14="http://schemas.microsoft.com/office/drawing/2010/main">
+                <a:effectLst>
+                  <a:outerShdw dist="35921" dir="2700000" algn="ctr" rotWithShape="0">
+                    <a:schemeClr val="bg2"/>
+                  </a:outerShdw>
+                </a:effectLst>
+              </a14:hiddenEffects>
+            </a:ext>
+          </a:extLst>
+        </p:spPr>
+        <p:txBody>
+          <a:bodyPr vert="horz" wrap="none" lIns="91440" tIns="45720" rIns="91440" bIns="45720" numCol="1" anchor="ctr" anchorCtr="0" compatLnSpc="1">
+            <a:prstTxWarp prst="textNoShape">
+              <a:avLst/>
+            </a:prstTxWarp>
+            <a:spAutoFit/>
+          </a:bodyPr>
+          <a:lstStyle/>
+          <a:p>
+            <a:endParaRPr lang="fr-FR"/>
+          </a:p>
+        </p:txBody>
+      </p:sp>
+      <p:pic>
+        <p:nvPicPr>
+          <p:cNvPr id="7" name="Image 6">
+            <a:extLst>
+              <a:ext uri="{FF2B5EF4-FFF2-40B4-BE49-F238E27FC236}">
+                <a16:creationId xmlns:a16="http://schemas.microsoft.com/office/drawing/2014/main" id="{5414C5DC-3D97-D28C-15DF-AF8D178EF63C}"/>
+              </a:ext>
+            </a:extLst>
+          </p:cNvPr>
+          <p:cNvPicPr>
+            <a:picLocks noChangeAspect="1"/>
+          </p:cNvPicPr>
+          <p:nvPr/>
+        </p:nvPicPr>
+        <p:blipFill>
+          <a:blip r:embed="rId2" cstate="print">
+            <a:extLst>
+              <a:ext uri="{28A0092B-C50C-407E-A947-70E740481C1C}">
+                <a14:useLocalDpi xmlns:a14="http://schemas.microsoft.com/office/drawing/2010/main" val="0"/>
+              </a:ext>
+            </a:extLst>
+          </a:blip>
+          <a:srcRect/>
+          <a:stretch/>
+        </p:blipFill>
+        <p:spPr>
+          <a:xfrm>
+            <a:off x="295835" y="1064653"/>
+            <a:ext cx="959224" cy="959224"/>
+          </a:xfrm>
+          <a:prstGeom prst="rect">
+            <a:avLst/>
+          </a:prstGeom>
+        </p:spPr>
+      </p:pic>
+      <p:sp>
+        <p:nvSpPr>
+          <p:cNvPr id="6" name="Rectangle 5">
+            <a:extLst>
+              <a:ext uri="{FF2B5EF4-FFF2-40B4-BE49-F238E27FC236}">
+                <a16:creationId xmlns:a16="http://schemas.microsoft.com/office/drawing/2014/main" id="{58619AA3-EA5D-4C75-31AE-F3A98AD830D5}"/>
+              </a:ext>
+            </a:extLst>
+          </p:cNvPr>
+          <p:cNvSpPr/>
+          <p:nvPr/>
+        </p:nvSpPr>
+        <p:spPr>
+          <a:xfrm>
+            <a:off x="357101" y="4719485"/>
+            <a:ext cx="3542544" cy="914400"/>
+          </a:xfrm>
+          <a:prstGeom prst="rect">
+            <a:avLst/>
+          </a:prstGeom>
+          <a:noFill/>
+          <a:ln>
+            <a:noFill/>
+          </a:ln>
+        </p:spPr>
+        <p:style>
+          <a:lnRef idx="2">
+            <a:schemeClr val="accent1">
+              <a:shade val="15000"/>
+            </a:schemeClr>
+          </a:lnRef>
+          <a:fillRef idx="1">
+            <a:schemeClr val="accent1"/>
+          </a:fillRef>
+          <a:effectRef idx="0">
+            <a:schemeClr val="accent1"/>
+          </a:effectRef>
+          <a:fontRef idx="minor">
+            <a:schemeClr val="lt1"/>
+          </a:fontRef>
+        </p:style>
+        <p:txBody>
+          <a:bodyPr rtlCol="0" anchor="ctr"/>
+          <a:lstStyle/>
+          <a:p>
+            <a:pPr algn="ctr"/>
+            <a:r>
+              <a:rPr lang="fr-FR" sz="3600" dirty="0">
+                <a:solidFill>
+                  <a:schemeClr val="tx1"/>
+                </a:solidFill>
+              </a:rPr>
+              <a:t>Teamcity+ Docker</a:t>
+            </a:r>
+            <a:endParaRPr lang="en-US" sz="3600" dirty="0">
+              <a:solidFill>
+                <a:schemeClr val="tx1"/>
+              </a:solidFill>
+            </a:endParaRPr>
+          </a:p>
+        </p:txBody>
+      </p:sp>
+      <p:pic>
+        <p:nvPicPr>
+          <p:cNvPr id="8" name="Image 6">
+            <a:extLst>
+              <a:ext uri="{FF2B5EF4-FFF2-40B4-BE49-F238E27FC236}">
+                <a16:creationId xmlns:a16="http://schemas.microsoft.com/office/drawing/2014/main" id="{043EF3E7-6B9C-3066-6213-76E035DC43DD}"/>
+              </a:ext>
+            </a:extLst>
+          </p:cNvPr>
+          <p:cNvPicPr>
+            <a:picLocks noChangeAspect="1"/>
+          </p:cNvPicPr>
+          <p:nvPr/>
+        </p:nvPicPr>
+        <p:blipFill>
+          <a:blip r:embed="rId3" cstate="print">
+            <a:extLst>
+              <a:ext uri="{28A0092B-C50C-407E-A947-70E740481C1C}">
+                <a14:useLocalDpi xmlns:a14="http://schemas.microsoft.com/office/drawing/2010/main" val="0"/>
+              </a:ext>
+            </a:extLst>
+          </a:blip>
+          <a:srcRect/>
+          <a:stretch/>
+        </p:blipFill>
+        <p:spPr>
+          <a:xfrm>
+            <a:off x="1398492" y="1270356"/>
+            <a:ext cx="735104" cy="659112"/>
+          </a:xfrm>
+          <a:prstGeom prst="rect">
+            <a:avLst/>
+          </a:prstGeom>
+        </p:spPr>
+      </p:pic>
+      <p:pic>
+        <p:nvPicPr>
+          <p:cNvPr id="10" name="Image 6">
+            <a:extLst>
+              <a:ext uri="{FF2B5EF4-FFF2-40B4-BE49-F238E27FC236}">
+                <a16:creationId xmlns:a16="http://schemas.microsoft.com/office/drawing/2014/main" id="{6CB2AEE0-13F0-4824-1E0B-3CD14D028377}"/>
+              </a:ext>
+            </a:extLst>
+          </p:cNvPr>
+          <p:cNvPicPr>
+            <a:picLocks noChangeAspect="1"/>
+          </p:cNvPicPr>
+          <p:nvPr/>
+        </p:nvPicPr>
+        <p:blipFill>
+          <a:blip r:embed="rId4" cstate="print">
+            <a:extLst>
+              <a:ext uri="{28A0092B-C50C-407E-A947-70E740481C1C}">
+                <a14:useLocalDpi xmlns:a14="http://schemas.microsoft.com/office/drawing/2010/main" val="0"/>
+              </a:ext>
+            </a:extLst>
+          </a:blip>
+          <a:srcRect r="64569" b="-3443"/>
+          <a:stretch/>
+        </p:blipFill>
+        <p:spPr>
+          <a:xfrm>
+            <a:off x="2519082" y="1260513"/>
+            <a:ext cx="561031" cy="731641"/>
+          </a:xfrm>
+          <a:prstGeom prst="rect">
+            <a:avLst/>
+          </a:prstGeom>
+        </p:spPr>
+      </p:pic>
+      <p:pic>
+        <p:nvPicPr>
+          <p:cNvPr id="12" name="Image 6">
+            <a:extLst>
+              <a:ext uri="{FF2B5EF4-FFF2-40B4-BE49-F238E27FC236}">
+                <a16:creationId xmlns:a16="http://schemas.microsoft.com/office/drawing/2014/main" id="{020FFEC4-F12D-6B5F-7A5E-0DED75F2E98F}"/>
+              </a:ext>
+            </a:extLst>
+          </p:cNvPr>
+          <p:cNvPicPr>
+            <a:picLocks noChangeAspect="1"/>
+          </p:cNvPicPr>
+          <p:nvPr/>
+        </p:nvPicPr>
+        <p:blipFill>
+          <a:blip r:embed="rId5" cstate="print">
+            <a:extLst>
+              <a:ext uri="{28A0092B-C50C-407E-A947-70E740481C1C}">
+                <a14:useLocalDpi xmlns:a14="http://schemas.microsoft.com/office/drawing/2010/main" val="0"/>
+              </a:ext>
+            </a:extLst>
+          </a:blip>
+          <a:srcRect l="-317" r="-3210" b="-12852"/>
+          <a:stretch/>
+        </p:blipFill>
+        <p:spPr>
+          <a:xfrm>
+            <a:off x="403411" y="2204732"/>
+            <a:ext cx="741809" cy="825665"/>
+          </a:xfrm>
+          <a:prstGeom prst="rect">
+            <a:avLst/>
+          </a:prstGeom>
+        </p:spPr>
+      </p:pic>
+      <p:pic>
+        <p:nvPicPr>
+          <p:cNvPr id="14" name="Image 6">
+            <a:extLst>
+              <a:ext uri="{FF2B5EF4-FFF2-40B4-BE49-F238E27FC236}">
+                <a16:creationId xmlns:a16="http://schemas.microsoft.com/office/drawing/2014/main" id="{4B85D07A-6DEE-48D7-0A05-C4BE7157DC31}"/>
+              </a:ext>
+            </a:extLst>
+          </p:cNvPr>
+          <p:cNvPicPr>
+            <a:picLocks noChangeAspect="1"/>
+          </p:cNvPicPr>
+          <p:nvPr/>
+        </p:nvPicPr>
+        <p:blipFill>
+          <a:blip r:embed="rId6">
+            <a:extLst>
+              <a:ext uri="{28A0092B-C50C-407E-A947-70E740481C1C}">
+                <a14:useLocalDpi xmlns:a14="http://schemas.microsoft.com/office/drawing/2010/main" val="0"/>
+              </a:ext>
+            </a:extLst>
+          </a:blip>
+          <a:srcRect l="4887" r="4887" b="33152"/>
+          <a:stretch/>
+        </p:blipFill>
+        <p:spPr>
+          <a:xfrm>
+            <a:off x="1435418" y="2213416"/>
+            <a:ext cx="741809" cy="693792"/>
+          </a:xfrm>
+          <a:prstGeom prst="rect">
+            <a:avLst/>
+          </a:prstGeom>
+        </p:spPr>
+      </p:pic>
+      <p:pic>
+        <p:nvPicPr>
+          <p:cNvPr id="9" name="Image 6">
+            <a:extLst>
+              <a:ext uri="{FF2B5EF4-FFF2-40B4-BE49-F238E27FC236}">
+                <a16:creationId xmlns:a16="http://schemas.microsoft.com/office/drawing/2014/main" id="{17E9FD00-209E-3FE6-4142-BB3DBA968CFE}"/>
+              </a:ext>
+            </a:extLst>
+          </p:cNvPr>
+          <p:cNvPicPr>
+            <a:picLocks noChangeAspect="1"/>
+          </p:cNvPicPr>
+          <p:nvPr/>
+        </p:nvPicPr>
+        <p:blipFill>
+          <a:blip r:embed="rId7" cstate="print">
+            <a:extLst>
+              <a:ext uri="{28A0092B-C50C-407E-A947-70E740481C1C}">
+                <a14:useLocalDpi xmlns:a14="http://schemas.microsoft.com/office/drawing/2010/main" val="0"/>
+              </a:ext>
+            </a:extLst>
+          </a:blip>
+          <a:srcRect t="3236" b="3236"/>
+          <a:stretch/>
+        </p:blipFill>
+        <p:spPr>
+          <a:xfrm>
+            <a:off x="2467426" y="2204405"/>
+            <a:ext cx="741809" cy="693792"/>
+          </a:xfrm>
+          <a:prstGeom prst="rect">
+            <a:avLst/>
+          </a:prstGeom>
+        </p:spPr>
+      </p:pic>
+      <p:pic>
+        <p:nvPicPr>
+          <p:cNvPr id="13" name="Picture 12">
+            <a:extLst>
+              <a:ext uri="{FF2B5EF4-FFF2-40B4-BE49-F238E27FC236}">
+                <a16:creationId xmlns:a16="http://schemas.microsoft.com/office/drawing/2014/main" id="{4318237E-5BD0-1E63-5DE3-B5A7942AA4FE}"/>
+              </a:ext>
+            </a:extLst>
+          </p:cNvPr>
+          <p:cNvPicPr>
+            <a:picLocks noChangeAspect="1"/>
+          </p:cNvPicPr>
+          <p:nvPr/>
+        </p:nvPicPr>
+        <p:blipFill>
+          <a:blip r:embed="rId8" cstate="print">
+            <a:extLst>
+              <a:ext uri="{28A0092B-C50C-407E-A947-70E740481C1C}">
+                <a14:useLocalDpi xmlns:a14="http://schemas.microsoft.com/office/drawing/2010/main" val="0"/>
+              </a:ext>
+            </a:extLst>
+          </a:blip>
+          <a:srcRect l="11964" t="37402" b="35660"/>
+          <a:stretch/>
+        </p:blipFill>
+        <p:spPr>
+          <a:xfrm>
+            <a:off x="85407" y="6166600"/>
+            <a:ext cx="2802129" cy="584775"/>
+          </a:xfrm>
+          <a:prstGeom prst="rect">
+            <a:avLst/>
+          </a:prstGeom>
+        </p:spPr>
+      </p:pic>
+      <p:sp>
+        <p:nvSpPr>
+          <p:cNvPr id="16" name="Rectangle 15">
+            <a:extLst>
+              <a:ext uri="{FF2B5EF4-FFF2-40B4-BE49-F238E27FC236}">
+                <a16:creationId xmlns:a16="http://schemas.microsoft.com/office/drawing/2014/main" id="{6F8FB23F-E484-0C76-1634-D9DEA8C62CCC}"/>
+              </a:ext>
+            </a:extLst>
+          </p:cNvPr>
+          <p:cNvSpPr/>
+          <p:nvPr/>
+        </p:nvSpPr>
+        <p:spPr>
+          <a:xfrm>
+            <a:off x="480742" y="3361794"/>
+            <a:ext cx="741809" cy="519711"/>
+          </a:xfrm>
+          <a:prstGeom prst="rect">
+            <a:avLst/>
+          </a:prstGeom>
+          <a:noFill/>
+          <a:ln>
+            <a:noFill/>
+          </a:ln>
+        </p:spPr>
+        <p:style>
+          <a:lnRef idx="2">
+            <a:schemeClr val="accent1">
+              <a:shade val="15000"/>
+            </a:schemeClr>
+          </a:lnRef>
+          <a:fillRef idx="1">
+            <a:schemeClr val="accent1"/>
+          </a:fillRef>
+          <a:effectRef idx="0">
+            <a:schemeClr val="accent1"/>
+          </a:effectRef>
+          <a:fontRef idx="minor">
+            <a:schemeClr val="lt1"/>
+          </a:fontRef>
+        </p:style>
+        <p:txBody>
+          <a:bodyPr rtlCol="0" anchor="ctr"/>
+          <a:lstStyle/>
+          <a:p>
+            <a:pPr algn="ctr"/>
+            <a:r>
+              <a:rPr lang="fr-FR" sz="2800" dirty="0">
+                <a:solidFill>
+                  <a:schemeClr val="tx1"/>
+                </a:solidFill>
+              </a:rPr>
+              <a:t>JNA</a:t>
+            </a:r>
+            <a:endParaRPr lang="en-US" sz="2800" dirty="0">
+              <a:solidFill>
+                <a:schemeClr val="tx1"/>
+              </a:solidFill>
+            </a:endParaRPr>
+          </a:p>
+        </p:txBody>
+      </p:sp>
+      <p:pic>
+        <p:nvPicPr>
+          <p:cNvPr id="11" name="Image 6">
+            <a:extLst>
+              <a:ext uri="{FF2B5EF4-FFF2-40B4-BE49-F238E27FC236}">
+                <a16:creationId xmlns:a16="http://schemas.microsoft.com/office/drawing/2014/main" id="{B572F2B3-5132-2603-5768-52819D56784E}"/>
+              </a:ext>
+            </a:extLst>
+          </p:cNvPr>
+          <p:cNvPicPr>
+            <a:picLocks noChangeAspect="1"/>
+          </p:cNvPicPr>
+          <p:nvPr/>
+        </p:nvPicPr>
+        <p:blipFill>
+          <a:blip r:embed="rId9" cstate="print">
+            <a:extLst>
+              <a:ext uri="{28A0092B-C50C-407E-A947-70E740481C1C}">
+                <a14:useLocalDpi xmlns:a14="http://schemas.microsoft.com/office/drawing/2010/main" val="0"/>
+              </a:ext>
+            </a:extLst>
+          </a:blip>
+          <a:srcRect l="23270" r="23270"/>
+          <a:stretch/>
+        </p:blipFill>
+        <p:spPr>
+          <a:xfrm>
+            <a:off x="1405172" y="3280163"/>
+            <a:ext cx="741809" cy="693792"/>
+          </a:xfrm>
+          <a:prstGeom prst="rect">
+            <a:avLst/>
+          </a:prstGeom>
+        </p:spPr>
+      </p:pic>
+      <p:pic>
+        <p:nvPicPr>
+          <p:cNvPr id="20" name="Image 6">
+            <a:extLst>
+              <a:ext uri="{FF2B5EF4-FFF2-40B4-BE49-F238E27FC236}">
+                <a16:creationId xmlns:a16="http://schemas.microsoft.com/office/drawing/2014/main" id="{53A27C17-B915-D7AD-20A7-ADC6D4293656}"/>
+              </a:ext>
+            </a:extLst>
+          </p:cNvPr>
+          <p:cNvPicPr>
+            <a:picLocks noChangeAspect="1"/>
+          </p:cNvPicPr>
+          <p:nvPr/>
+        </p:nvPicPr>
+        <p:blipFill>
+          <a:blip r:embed="rId10" cstate="print">
+            <a:extLst>
+              <a:ext uri="{28A0092B-C50C-407E-A947-70E740481C1C}">
+                <a14:useLocalDpi xmlns:a14="http://schemas.microsoft.com/office/drawing/2010/main" val="0"/>
+              </a:ext>
+            </a:extLst>
+          </a:blip>
+          <a:srcRect t="-626" b="-1115"/>
+          <a:stretch/>
+        </p:blipFill>
+        <p:spPr>
+          <a:xfrm>
+            <a:off x="5137251" y="2385334"/>
+            <a:ext cx="2930983" cy="3027343"/>
+          </a:xfrm>
+          <a:prstGeom prst="rect">
+            <a:avLst/>
+          </a:prstGeom>
+        </p:spPr>
+      </p:pic>
+      <p:sp>
+        <p:nvSpPr>
+          <p:cNvPr id="4" name="Rectangle : coins arrondis 31">
+            <a:extLst>
+              <a:ext uri="{FF2B5EF4-FFF2-40B4-BE49-F238E27FC236}">
+                <a16:creationId xmlns:a16="http://schemas.microsoft.com/office/drawing/2014/main" id="{DBC9E5BD-991D-EAAE-221F-BF92BD3F0E09}"/>
+              </a:ext>
+            </a:extLst>
+          </p:cNvPr>
+          <p:cNvSpPr/>
+          <p:nvPr/>
+        </p:nvSpPr>
+        <p:spPr>
+          <a:xfrm>
+            <a:off x="2469675" y="3209873"/>
+            <a:ext cx="815662" cy="825665"/>
+          </a:xfrm>
+          <a:prstGeom prst="roundRect">
+            <a:avLst>
+              <a:gd name="adj" fmla="val 11930"/>
+            </a:avLst>
+          </a:prstGeom>
+          <a:noFill/>
+          <a:ln w="28575">
+            <a:solidFill>
+              <a:schemeClr val="accent5"/>
+            </a:solidFill>
+          </a:ln>
+        </p:spPr>
+        <p:style>
+          <a:lnRef idx="2">
+            <a:schemeClr val="accent1">
+              <a:shade val="50000"/>
+            </a:schemeClr>
+          </a:lnRef>
+          <a:fillRef idx="1">
+            <a:schemeClr val="accent1"/>
+          </a:fillRef>
+          <a:effectRef idx="0">
+            <a:schemeClr val="accent1"/>
+          </a:effectRef>
+          <a:fontRef idx="minor">
+            <a:schemeClr val="lt1"/>
+          </a:fontRef>
+        </p:style>
+        <p:txBody>
+          <a:bodyPr rtlCol="0" anchor="ctr"/>
+          <a:lstStyle/>
+          <a:p>
+            <a:pPr algn="ctr"/>
+            <a:endParaRPr lang="en-US"/>
+          </a:p>
+        </p:txBody>
+      </p:sp>
+      <p:pic>
+        <p:nvPicPr>
+          <p:cNvPr id="5" name="Image 6">
+            <a:extLst>
+              <a:ext uri="{FF2B5EF4-FFF2-40B4-BE49-F238E27FC236}">
+                <a16:creationId xmlns:a16="http://schemas.microsoft.com/office/drawing/2014/main" id="{8501BB6B-E83D-00D3-B969-2ECEE8545F30}"/>
+              </a:ext>
+            </a:extLst>
+          </p:cNvPr>
+          <p:cNvPicPr>
+            <a:picLocks noChangeAspect="1"/>
+          </p:cNvPicPr>
+          <p:nvPr/>
+        </p:nvPicPr>
+        <p:blipFill>
+          <a:blip r:embed="rId11" cstate="print">
+            <a:extLst>
+              <a:ext uri="{28A0092B-C50C-407E-A947-70E740481C1C}">
+                <a14:useLocalDpi xmlns:a14="http://schemas.microsoft.com/office/drawing/2010/main" val="0"/>
+              </a:ext>
+            </a:extLst>
+          </a:blip>
+          <a:srcRect t="3236" b="3236"/>
+          <a:stretch/>
+        </p:blipFill>
+        <p:spPr>
+          <a:xfrm>
+            <a:off x="2516631" y="3280163"/>
+            <a:ext cx="741809" cy="693792"/>
+          </a:xfrm>
+          <a:prstGeom prst="rect">
+            <a:avLst/>
+          </a:prstGeom>
+        </p:spPr>
+      </p:pic>
+      <p:pic>
+        <p:nvPicPr>
+          <p:cNvPr id="18" name="Image 6">
+            <a:extLst>
+              <a:ext uri="{FF2B5EF4-FFF2-40B4-BE49-F238E27FC236}">
+                <a16:creationId xmlns:a16="http://schemas.microsoft.com/office/drawing/2014/main" id="{FCBB22BC-71E2-98E2-0D30-A024B9105562}"/>
+              </a:ext>
+            </a:extLst>
+          </p:cNvPr>
+          <p:cNvPicPr>
+            <a:picLocks noChangeAspect="1"/>
+          </p:cNvPicPr>
+          <p:nvPr/>
+        </p:nvPicPr>
+        <p:blipFill>
+          <a:blip r:embed="rId12">
+            <a:extLst>
+              <a:ext uri="{28A0092B-C50C-407E-A947-70E740481C1C}">
+                <a14:useLocalDpi xmlns:a14="http://schemas.microsoft.com/office/drawing/2010/main" val="0"/>
+              </a:ext>
+            </a:extLst>
+          </a:blip>
+          <a:srcRect l="-3829" r="-5298"/>
+          <a:stretch/>
+        </p:blipFill>
+        <p:spPr>
+          <a:xfrm>
+            <a:off x="8695765" y="2288727"/>
+            <a:ext cx="3254188" cy="3027343"/>
+          </a:xfrm>
+          <a:prstGeom prst="rect">
+            <a:avLst/>
+          </a:prstGeom>
+        </p:spPr>
+      </p:pic>
+    </p:spTree>
+    <p:extLst>
+      <p:ext uri="{BB962C8B-B14F-4D97-AF65-F5344CB8AC3E}">
+        <p14:creationId xmlns:p14="http://schemas.microsoft.com/office/powerpoint/2010/main" val="4290177777"/>
+      </p:ext>
+    </p:extLst>
+  </p:cSld>
+  <p:clrMapOvr>
+    <a:masterClrMapping/>
+  </p:clrMapOvr>
+  <mc:AlternateContent xmlns:mc="http://schemas.openxmlformats.org/markup-compatibility/2006">
+    <mc:Choice xmlns:p14="http://schemas.microsoft.com/office/powerpoint/2010/main" Requires="p14">
+      <p:transition spd="med" p14:dur="700">
+        <p:fade/>
+      </p:transition>
+    </mc:Choice>
+    <mc:Fallback>
+      <p:transition spd="med">
+        <p:fade/>
+      </p:transition>
+    </mc:Fallback>
+  </mc:AlternateContent>
+</p:sld>
+</file>
+
+<file path=ppt/slides/slide12.xml><?xml version="1.0" encoding="utf-8"?>
+<p:sld xmlns:a="http://schemas.openxmlformats.org/drawingml/2006/main" xmlns:r="http://schemas.openxmlformats.org/officeDocument/2006/relationships" xmlns:p="http://schemas.openxmlformats.org/presentationml/2006/main">
+  <p:cSld>
+    <p:spTree>
+      <p:nvGrpSpPr>
+        <p:cNvPr id="1" name="">
+          <a:extLst>
+            <a:ext uri="{FF2B5EF4-FFF2-40B4-BE49-F238E27FC236}">
               <a16:creationId xmlns:a16="http://schemas.microsoft.com/office/drawing/2014/main" id="{9FCBCB9D-8BA7-1A6F-44D2-C8A876985467}"/>
             </a:ext>
           </a:extLst>
@@ -6563,7 +7539,7 @@
             <a:fld id="{D2B4BBCC-EA5B-4A7E-8C0A-AC47B4F5C809}" type="slidenum">
               <a:rPr lang="fr-FR" smtClean="0"/>
               <a:pPr/>
-              <a:t>11</a:t>
+              <a:t>12</a:t>
             </a:fld>
             <a:endParaRPr lang="fr-FR" dirty="0"/>
           </a:p>
@@ -6736,7 +7712,7 @@
 </p:sld>
 </file>
 
-<file path=ppt/slides/slide12.xml><?xml version="1.0" encoding="utf-8"?>
+<file path=ppt/slides/slide13.xml><?xml version="1.0" encoding="utf-8"?>
 <p:sld xmlns:a="http://schemas.openxmlformats.org/drawingml/2006/main" xmlns:r="http://schemas.openxmlformats.org/officeDocument/2006/relationships" xmlns:p="http://schemas.openxmlformats.org/presentationml/2006/main">
   <p:cSld>
     <p:spTree>
@@ -6783,7 +7759,7 @@
             <a:fld id="{D2B4BBCC-EA5B-4A7E-8C0A-AC47B4F5C809}" type="slidenum">
               <a:rPr lang="fr-FR" smtClean="0"/>
               <a:pPr/>
-              <a:t>12</a:t>
+              <a:t>13</a:t>
             </a:fld>
             <a:endParaRPr lang="fr-FR" dirty="0"/>
           </a:p>

</xml_diff>

<commit_message>
developpement de l'interface thymeleaf pour faire sonner l'application
</commit_message>
<xml_diff>
--- a/Diapositives de presentation.pptx
+++ b/Diapositives de presentation.pptx
@@ -237,7 +237,7 @@
           <a:p>
             <a:fld id="{C83129A4-13CA-454A-9701-F815788E5EF5}" type="datetimeFigureOut">
               <a:rPr lang="fr-FR" smtClean="0"/>
-              <a:t>26/12/2024</a:t>
+              <a:t>27/12/2024</a:t>
             </a:fld>
             <a:endParaRPr lang="fr-FR"/>
           </a:p>
@@ -633,7 +633,7 @@
           <a:p>
             <a:fld id="{1C038D69-E8C6-41F4-B320-1C8C485B6F43}" type="datetime1">
               <a:rPr lang="fr-FR" smtClean="0"/>
-              <a:t>26/12/2024</a:t>
+              <a:t>27/12/2024</a:t>
             </a:fld>
             <a:endParaRPr lang="fr-FR"/>
           </a:p>
@@ -840,7 +840,7 @@
           <a:p>
             <a:fld id="{616DC8CD-C26B-4098-BB10-9DDAEE5B9BCE}" type="datetime1">
               <a:rPr lang="fr-FR" smtClean="0"/>
-              <a:t>26/12/2024</a:t>
+              <a:t>27/12/2024</a:t>
             </a:fld>
             <a:endParaRPr lang="fr-FR"/>
           </a:p>
@@ -1018,7 +1018,7 @@
           <a:p>
             <a:fld id="{D4079226-37CB-426E-B289-8E25D3475401}" type="datetime1">
               <a:rPr lang="fr-FR" smtClean="0"/>
-              <a:t>26/12/2024</a:t>
+              <a:t>27/12/2024</a:t>
             </a:fld>
             <a:endParaRPr lang="fr-FR"/>
           </a:p>
@@ -1113,7 +1113,7 @@
           <a:p>
             <a:fld id="{F6B747DC-6B14-4AFB-A709-02A30F487EAE}" type="datetime1">
               <a:rPr lang="fr-FR" smtClean="0"/>
-              <a:t>26/12/2024</a:t>
+              <a:t>27/12/2024</a:t>
             </a:fld>
             <a:endParaRPr lang="fr-FR"/>
           </a:p>
@@ -1320,7 +1320,7 @@
           <a:p>
             <a:fld id="{F6B747DC-6B14-4AFB-A709-02A30F487EAE}" type="datetime1">
               <a:rPr lang="fr-FR" smtClean="0"/>
-              <a:t>26/12/2024</a:t>
+              <a:t>27/12/2024</a:t>
             </a:fld>
             <a:endParaRPr lang="fr-FR"/>
           </a:p>
@@ -1527,7 +1527,7 @@
           <a:p>
             <a:fld id="{F6B747DC-6B14-4AFB-A709-02A30F487EAE}" type="datetime1">
               <a:rPr lang="fr-FR" smtClean="0"/>
-              <a:t>26/12/2024</a:t>
+              <a:t>27/12/2024</a:t>
             </a:fld>
             <a:endParaRPr lang="fr-FR"/>
           </a:p>
@@ -1734,7 +1734,7 @@
           <a:p>
             <a:fld id="{F6B747DC-6B14-4AFB-A709-02A30F487EAE}" type="datetime1">
               <a:rPr lang="fr-FR" smtClean="0"/>
-              <a:t>26/12/2024</a:t>
+              <a:t>27/12/2024</a:t>
             </a:fld>
             <a:endParaRPr lang="fr-FR"/>
           </a:p>
@@ -1941,7 +1941,7 @@
           <a:p>
             <a:fld id="{F6B747DC-6B14-4AFB-A709-02A30F487EAE}" type="datetime1">
               <a:rPr lang="fr-FR" smtClean="0"/>
-              <a:t>26/12/2024</a:t>
+              <a:t>27/12/2024</a:t>
             </a:fld>
             <a:endParaRPr lang="fr-FR"/>
           </a:p>
@@ -2148,7 +2148,7 @@
           <a:p>
             <a:fld id="{F6B747DC-6B14-4AFB-A709-02A30F487EAE}" type="datetime1">
               <a:rPr lang="fr-FR" smtClean="0"/>
-              <a:t>26/12/2024</a:t>
+              <a:t>27/12/2024</a:t>
             </a:fld>
             <a:endParaRPr lang="fr-FR"/>
           </a:p>
@@ -2355,7 +2355,7 @@
           <a:p>
             <a:fld id="{F6B747DC-6B14-4AFB-A709-02A30F487EAE}" type="datetime1">
               <a:rPr lang="fr-FR" smtClean="0"/>
-              <a:t>26/12/2024</a:t>
+              <a:t>27/12/2024</a:t>
             </a:fld>
             <a:endParaRPr lang="fr-FR"/>
           </a:p>
@@ -2562,7 +2562,7 @@
           <a:p>
             <a:fld id="{F6B747DC-6B14-4AFB-A709-02A30F487EAE}" type="datetime1">
               <a:rPr lang="fr-FR" smtClean="0"/>
-              <a:t>26/12/2024</a:t>
+              <a:t>27/12/2024</a:t>
             </a:fld>
             <a:endParaRPr lang="fr-FR"/>
           </a:p>
@@ -2842,7 +2842,7 @@
           <a:p>
             <a:fld id="{528315D5-587C-4700-832D-CB7F8BC01C0F}" type="datetime1">
               <a:rPr lang="fr-FR" smtClean="0"/>
-              <a:t>26/12/2024</a:t>
+              <a:t>27/12/2024</a:t>
             </a:fld>
             <a:endParaRPr lang="fr-FR"/>
           </a:p>
@@ -3088,7 +3088,7 @@
           <a:p>
             <a:fld id="{40E68B3C-FDDD-4703-9E79-D68F45540A20}" type="datetime1">
               <a:rPr lang="fr-FR" smtClean="0"/>
-              <a:t>26/12/2024</a:t>
+              <a:t>27/12/2024</a:t>
             </a:fld>
             <a:endParaRPr lang="fr-FR"/>
           </a:p>
@@ -3317,7 +3317,7 @@
           <a:p>
             <a:fld id="{3C263683-9D2E-4B48-953F-B9784A5AAE78}" type="datetime1">
               <a:rPr lang="fr-FR" smtClean="0"/>
-              <a:t>26/12/2024</a:t>
+              <a:t>27/12/2024</a:t>
             </a:fld>
             <a:endParaRPr lang="fr-FR"/>
           </a:p>
@@ -3681,7 +3681,7 @@
           <a:p>
             <a:fld id="{7F0B7BBE-AECC-41F0-893A-7D2E8C089F5C}" type="datetime1">
               <a:rPr lang="fr-FR" smtClean="0"/>
-              <a:t>26/12/2024</a:t>
+              <a:t>27/12/2024</a:t>
             </a:fld>
             <a:endParaRPr lang="fr-FR"/>
           </a:p>
@@ -3798,7 +3798,7 @@
           <a:p>
             <a:fld id="{426F0B9E-0863-404B-A3E2-D58EA83ACDC5}" type="datetime1">
               <a:rPr lang="fr-FR" smtClean="0"/>
-              <a:t>26/12/2024</a:t>
+              <a:t>27/12/2024</a:t>
             </a:fld>
             <a:endParaRPr lang="fr-FR"/>
           </a:p>
@@ -3893,7 +3893,7 @@
           <a:p>
             <a:fld id="{4EC7B2EC-1B5B-4386-8796-A1B046544C15}" type="datetime1">
               <a:rPr lang="fr-FR" smtClean="0"/>
-              <a:t>26/12/2024</a:t>
+              <a:t>27/12/2024</a:t>
             </a:fld>
             <a:endParaRPr lang="fr-FR"/>
           </a:p>
@@ -4168,7 +4168,7 @@
           <a:p>
             <a:fld id="{43AD984E-D9C5-44AD-BE15-3CF05681CFD8}" type="datetime1">
               <a:rPr lang="fr-FR" smtClean="0"/>
-              <a:t>26/12/2024</a:t>
+              <a:t>27/12/2024</a:t>
             </a:fld>
             <a:endParaRPr lang="fr-FR"/>
           </a:p>
@@ -4420,7 +4420,7 @@
           <a:p>
             <a:fld id="{CC476FF9-AD78-4ED2-8C79-DDAF60FCAAD4}" type="datetime1">
               <a:rPr lang="fr-FR" smtClean="0"/>
-              <a:t>26/12/2024</a:t>
+              <a:t>27/12/2024</a:t>
             </a:fld>
             <a:endParaRPr lang="fr-FR"/>
           </a:p>
@@ -4631,7 +4631,7 @@
           <a:p>
             <a:fld id="{528315D5-587C-4700-832D-CB7F8BC01C0F}" type="datetime1">
               <a:rPr lang="fr-FR" smtClean="0"/>
-              <a:t>26/12/2024</a:t>
+              <a:t>27/12/2024</a:t>
             </a:fld>
             <a:endParaRPr lang="fr-FR"/>
           </a:p>
@@ -5295,14 +5295,13 @@
               </a:ext>
             </a:extLst>
           </a:blip>
-          <a:stretch>
-            <a:fillRect/>
-          </a:stretch>
+          <a:srcRect l="1724" t="5201" r="1801"/>
+          <a:stretch/>
         </p:blipFill>
         <p:spPr>
           <a:xfrm>
-            <a:off x="2560353" y="3221831"/>
-            <a:ext cx="6969128" cy="2345861"/>
+            <a:off x="1901383" y="3166749"/>
+            <a:ext cx="8534246" cy="2822765"/>
           </a:xfrm>
           <a:prstGeom prst="rect">
             <a:avLst/>
@@ -11669,13 +11668,13 @@
   <p:clrMapOvr>
     <a:masterClrMapping/>
   </p:clrMapOvr>
-  <mc:AlternateContent xmlns:mc="http://schemas.openxmlformats.org/markup-compatibility/2006">
-    <mc:Choice xmlns:p159="http://schemas.microsoft.com/office/powerpoint/2015/09/main" Requires="p159">
+  <mc:AlternateContent xmlns:mc="http://schemas.openxmlformats.org/markup-compatibility/2006" xmlns:p159="http://schemas.microsoft.com/office/powerpoint/2015/09/main">
+    <mc:Choice Requires="p159">
       <p:transition xmlns:p14="http://schemas.microsoft.com/office/powerpoint/2010/main" p14:dur="250">
         <p159:morph option="byObject"/>
       </p:transition>
     </mc:Choice>
-    <mc:Fallback>
+    <mc:Fallback xmlns="">
       <p:transition>
         <p:fade/>
       </p:transition>
@@ -13208,13 +13207,13 @@
   <p:clrMapOvr>
     <a:masterClrMapping/>
   </p:clrMapOvr>
-  <mc:AlternateContent xmlns:mc="http://schemas.openxmlformats.org/markup-compatibility/2006">
-    <mc:Choice xmlns:p159="http://schemas.microsoft.com/office/powerpoint/2015/09/main" Requires="p159">
+  <mc:AlternateContent xmlns:mc="http://schemas.openxmlformats.org/markup-compatibility/2006" xmlns:p159="http://schemas.microsoft.com/office/powerpoint/2015/09/main">
+    <mc:Choice Requires="p159">
       <p:transition xmlns:p14="http://schemas.microsoft.com/office/powerpoint/2010/main" p14:dur="250">
         <p159:morph option="byObject"/>
       </p:transition>
     </mc:Choice>
-    <mc:Fallback>
+    <mc:Fallback xmlns="">
       <p:transition>
         <p:fade/>
       </p:transition>

</xml_diff>